<commit_message>
addressed some of Sean's comments
</commit_message>
<xml_diff>
--- a/idioms/indicator/c2-indicator/diagram.pptx
+++ b/idioms/indicator/c2-indicator/diagram.pptx
@@ -288,7 +288,7 @@
           <a:p>
             <a:fld id="{13F24B86-36D2-4655-BE2F-98B661AC85E1}" type="datetimeFigureOut">
               <a:rPr lang="en-US" smtClean="0"/>
-              <a:t>3/19/2014</a:t>
+              <a:t>3/28/2014</a:t>
             </a:fld>
             <a:endParaRPr lang="en-US"/>
           </a:p>
@@ -458,7 +458,7 @@
           <a:p>
             <a:fld id="{13F24B86-36D2-4655-BE2F-98B661AC85E1}" type="datetimeFigureOut">
               <a:rPr lang="en-US" smtClean="0"/>
-              <a:t>3/19/2014</a:t>
+              <a:t>3/28/2014</a:t>
             </a:fld>
             <a:endParaRPr lang="en-US"/>
           </a:p>
@@ -638,7 +638,7 @@
           <a:p>
             <a:fld id="{13F24B86-36D2-4655-BE2F-98B661AC85E1}" type="datetimeFigureOut">
               <a:rPr lang="en-US" smtClean="0"/>
-              <a:t>3/19/2014</a:t>
+              <a:t>3/28/2014</a:t>
             </a:fld>
             <a:endParaRPr lang="en-US"/>
           </a:p>
@@ -808,7 +808,7 @@
           <a:p>
             <a:fld id="{13F24B86-36D2-4655-BE2F-98B661AC85E1}" type="datetimeFigureOut">
               <a:rPr lang="en-US" smtClean="0"/>
-              <a:t>3/19/2014</a:t>
+              <a:t>3/28/2014</a:t>
             </a:fld>
             <a:endParaRPr lang="en-US"/>
           </a:p>
@@ -1054,7 +1054,7 @@
           <a:p>
             <a:fld id="{13F24B86-36D2-4655-BE2F-98B661AC85E1}" type="datetimeFigureOut">
               <a:rPr lang="en-US" smtClean="0"/>
-              <a:t>3/19/2014</a:t>
+              <a:t>3/28/2014</a:t>
             </a:fld>
             <a:endParaRPr lang="en-US"/>
           </a:p>
@@ -1342,7 +1342,7 @@
           <a:p>
             <a:fld id="{13F24B86-36D2-4655-BE2F-98B661AC85E1}" type="datetimeFigureOut">
               <a:rPr lang="en-US" smtClean="0"/>
-              <a:t>3/19/2014</a:t>
+              <a:t>3/28/2014</a:t>
             </a:fld>
             <a:endParaRPr lang="en-US"/>
           </a:p>
@@ -1764,7 +1764,7 @@
           <a:p>
             <a:fld id="{13F24B86-36D2-4655-BE2F-98B661AC85E1}" type="datetimeFigureOut">
               <a:rPr lang="en-US" smtClean="0"/>
-              <a:t>3/19/2014</a:t>
+              <a:t>3/28/2014</a:t>
             </a:fld>
             <a:endParaRPr lang="en-US"/>
           </a:p>
@@ -1882,7 +1882,7 @@
           <a:p>
             <a:fld id="{13F24B86-36D2-4655-BE2F-98B661AC85E1}" type="datetimeFigureOut">
               <a:rPr lang="en-US" smtClean="0"/>
-              <a:t>3/19/2014</a:t>
+              <a:t>3/28/2014</a:t>
             </a:fld>
             <a:endParaRPr lang="en-US"/>
           </a:p>
@@ -1977,7 +1977,7 @@
           <a:p>
             <a:fld id="{13F24B86-36D2-4655-BE2F-98B661AC85E1}" type="datetimeFigureOut">
               <a:rPr lang="en-US" smtClean="0"/>
-              <a:t>3/19/2014</a:t>
+              <a:t>3/28/2014</a:t>
             </a:fld>
             <a:endParaRPr lang="en-US"/>
           </a:p>
@@ -2254,7 +2254,7 @@
           <a:p>
             <a:fld id="{13F24B86-36D2-4655-BE2F-98B661AC85E1}" type="datetimeFigureOut">
               <a:rPr lang="en-US" smtClean="0"/>
-              <a:t>3/19/2014</a:t>
+              <a:t>3/28/2014</a:t>
             </a:fld>
             <a:endParaRPr lang="en-US"/>
           </a:p>
@@ -2507,7 +2507,7 @@
           <a:p>
             <a:fld id="{13F24B86-36D2-4655-BE2F-98B661AC85E1}" type="datetimeFigureOut">
               <a:rPr lang="en-US" smtClean="0"/>
-              <a:t>3/19/2014</a:t>
+              <a:t>3/28/2014</a:t>
             </a:fld>
             <a:endParaRPr lang="en-US"/>
           </a:p>
@@ -2720,7 +2720,7 @@
           <a:p>
             <a:fld id="{13F24B86-36D2-4655-BE2F-98B661AC85E1}" type="datetimeFigureOut">
               <a:rPr lang="en-US" smtClean="0"/>
-              <a:t>3/19/2014</a:t>
+              <a:t>3/28/2014</a:t>
             </a:fld>
             <a:endParaRPr lang="en-US"/>
           </a:p>
@@ -3276,7 +3276,6 @@
                         <a:rPr lang="en-US" sz="1100" dirty="0" smtClean="0"/>
                         <a:t>example:Indicator-33fe3b22-0201-47cf-85d0-97c02164528d</a:t>
                       </a:r>
-                      <a:endParaRPr lang="en-US" sz="1100" dirty="0" smtClean="0"/>
                     </a:p>
                   </a:txBody>
                   <a:tcPr>
@@ -3361,7 +3360,6 @@
                         <a:rPr lang="en-US" sz="1100" dirty="0" smtClean="0"/>
                         <a:t>IP Address for known C2 Channel</a:t>
                       </a:r>
-                      <a:endParaRPr lang="en-US" sz="1100" dirty="0" smtClean="0"/>
                     </a:p>
                   </a:txBody>
                   <a:tcPr>
@@ -3529,13 +3527,6 @@
                         </a:rPr>
                         <a:t>IndicatorTypeVocab-1.1</a:t>
                       </a:r>
-                      <a:endParaRPr lang="en-US" sz="1100" b="0" dirty="0" smtClean="0">
-                        <a:solidFill>
-                          <a:schemeClr val="bg1">
-                            <a:lumMod val="50000"/>
-                          </a:schemeClr>
-                        </a:solidFill>
-                      </a:endParaRPr>
                     </a:p>
                   </a:txBody>
                   <a:tcPr>
@@ -3965,7 +3956,6 @@
                         <a:rPr lang="en-US" sz="1100" b="0" dirty="0" smtClean="0"/>
                         <a:t>ipv4-addr</a:t>
                       </a:r>
-                      <a:endParaRPr lang="en-US" sz="1100" b="0" dirty="0" smtClean="0"/>
                     </a:p>
                   </a:txBody>
                   <a:tcPr>
@@ -4113,7 +4103,6 @@
                         <a:rPr lang="en-US" sz="1100" b="0" dirty="0" smtClean="0"/>
                         <a:t>10.0.0.0</a:t>
                       </a:r>
-                      <a:endParaRPr lang="en-US" sz="1100" b="0" dirty="0" smtClean="0"/>
                     </a:p>
                   </a:txBody>
                   <a:tcPr>
@@ -4257,7 +4246,6 @@
                         <a:rPr lang="en-US" sz="1100" b="0" dirty="0" smtClean="0"/>
                         <a:t>Equals</a:t>
                       </a:r>
-                      <a:endParaRPr lang="en-US" sz="1100" b="0" dirty="0" smtClean="0"/>
                     </a:p>
                   </a:txBody>
                   <a:tcPr>
@@ -4694,7 +4682,6 @@
                         <a:rPr lang="en-US" sz="1100" b="0" dirty="0" smtClean="0"/>
                         <a:t>example:TTP-bc66360d-a7d1-4d8c-ad1a-ea3a13d62da9</a:t>
                       </a:r>
-                      <a:endParaRPr lang="en-US" sz="1100" b="0" dirty="0" smtClean="0"/>
                     </a:p>
                   </a:txBody>
                   <a:tcPr>
@@ -4814,7 +4801,7 @@
           <p:nvPr>
             <p:extLst>
               <p:ext uri="{D42A27DB-BD31-4B8C-83A1-F6EECF244321}">
-                <p14:modId xmlns:p14="http://schemas.microsoft.com/office/powerpoint/2010/main" val="2561975201"/>
+                <p14:modId xmlns:p14="http://schemas.microsoft.com/office/powerpoint/2010/main" val="1757834686"/>
               </p:ext>
             </p:extLst>
           </p:nvPr>
@@ -4972,10 +4959,10 @@
                     <a:lstStyle/>
                     <a:p>
                       <a:r>
-                        <a:rPr lang="en-US" sz="1100" dirty="0" smtClean="0"/>
-                        <a:t>example:Indicator-33fe3b22-0201-47cf-85d0-97c02164528d</a:t>
+                        <a:rPr lang="en-US" sz="1100" b="0" dirty="0" smtClean="0"/>
+                        <a:t>example:TTP-bc66360d-a7d1-4d8c-ad1a-ea3a13d62da9</a:t>
                       </a:r>
-                      <a:endParaRPr lang="en-US" sz="1100" dirty="0" smtClean="0"/>
+                      <a:endParaRPr lang="en-US" sz="1100" b="0" dirty="0" smtClean="0"/>
                     </a:p>
                   </a:txBody>
                   <a:tcPr>
@@ -5059,7 +5046,6 @@
                         <a:rPr lang="en-US" sz="1100" dirty="0" smtClean="0"/>
                         <a:t>C2 Behavior</a:t>
                       </a:r>
-                      <a:endParaRPr lang="en-US" sz="1100" dirty="0" smtClean="0"/>
                     </a:p>
                   </a:txBody>
                   <a:tcPr>

</xml_diff>